<commit_message>
Updated the SBML figure to show both Model objects.
</commit_message>
<xml_diff>
--- a/sbml-level-3/version-1/comp/HierarchicalSBML.pptx
+++ b/sbml-level-3/version-1/comp/HierarchicalSBML.pptx
@@ -7,7 +7,7 @@
   <p:sldIdLst>
     <p:sldId id="256" r:id="rId2"/>
   </p:sldIdLst>
-  <p:sldSz cx="3657600" cy="1736725"/>
+  <p:sldSz cx="3657600" cy="2193925"/>
   <p:notesSz cx="6858000" cy="9144000"/>
   <p:defaultTextStyle>
     <a:defPPr>
@@ -136,8 +136,8 @@
         </p:nvSpPr>
         <p:spPr>
           <a:xfrm>
-            <a:off x="274320" y="539513"/>
-            <a:ext cx="3108960" cy="372271"/>
+            <a:off x="274320" y="681543"/>
+            <a:ext cx="3108960" cy="470273"/>
           </a:xfrm>
         </p:spPr>
         <p:txBody>
@@ -164,8 +164,8 @@
         </p:nvSpPr>
         <p:spPr>
           <a:xfrm>
-            <a:off x="548640" y="984144"/>
-            <a:ext cx="2560320" cy="443830"/>
+            <a:off x="548640" y="1243224"/>
+            <a:ext cx="2560320" cy="560670"/>
           </a:xfrm>
         </p:spPr>
         <p:txBody>
@@ -288,7 +288,7 @@
           <a:p>
             <a:fld id="{F0172217-DC24-48CD-AE89-68C8C8D878B4}" type="datetimeFigureOut">
               <a:rPr lang="en-US" smtClean="0"/>
-              <a:t>9/28/2010</a:t>
+              <a:t>10/9/2010</a:t>
             </a:fld>
             <a:endParaRPr lang="en-US"/>
           </a:p>
@@ -458,7 +458,7 @@
           <a:p>
             <a:fld id="{F0172217-DC24-48CD-AE89-68C8C8D878B4}" type="datetimeFigureOut">
               <a:rPr lang="en-US" smtClean="0"/>
-              <a:t>9/28/2010</a:t>
+              <a:t>10/9/2010</a:t>
             </a:fld>
             <a:endParaRPr lang="en-US"/>
           </a:p>
@@ -548,8 +548,8 @@
         </p:nvSpPr>
         <p:spPr>
           <a:xfrm>
-            <a:off x="2651760" y="69552"/>
-            <a:ext cx="822960" cy="1481845"/>
+            <a:off x="2651760" y="87862"/>
+            <a:ext cx="822960" cy="1871947"/>
           </a:xfrm>
         </p:spPr>
         <p:txBody>
@@ -576,8 +576,8 @@
         </p:nvSpPr>
         <p:spPr>
           <a:xfrm>
-            <a:off x="182880" y="69552"/>
-            <a:ext cx="2407920" cy="1481845"/>
+            <a:off x="182880" y="87862"/>
+            <a:ext cx="2407920" cy="1871947"/>
           </a:xfrm>
         </p:spPr>
         <p:txBody>
@@ -638,7 +638,7 @@
           <a:p>
             <a:fld id="{F0172217-DC24-48CD-AE89-68C8C8D878B4}" type="datetimeFigureOut">
               <a:rPr lang="en-US" smtClean="0"/>
-              <a:t>9/28/2010</a:t>
+              <a:t>10/9/2010</a:t>
             </a:fld>
             <a:endParaRPr lang="en-US"/>
           </a:p>
@@ -808,7 +808,7 @@
           <a:p>
             <a:fld id="{F0172217-DC24-48CD-AE89-68C8C8D878B4}" type="datetimeFigureOut">
               <a:rPr lang="en-US" smtClean="0"/>
-              <a:t>9/28/2010</a:t>
+              <a:t>10/9/2010</a:t>
             </a:fld>
             <a:endParaRPr lang="en-US"/>
           </a:p>
@@ -898,8 +898,8 @@
         </p:nvSpPr>
         <p:spPr>
           <a:xfrm>
-            <a:off x="288926" y="1116007"/>
-            <a:ext cx="3108960" cy="344933"/>
+            <a:off x="288926" y="1409801"/>
+            <a:ext cx="3108960" cy="435738"/>
           </a:xfrm>
         </p:spPr>
         <p:txBody>
@@ -930,8 +930,8 @@
         </p:nvSpPr>
         <p:spPr>
           <a:xfrm>
-            <a:off x="288926" y="736102"/>
-            <a:ext cx="3108960" cy="379908"/>
+            <a:off x="288926" y="929884"/>
+            <a:ext cx="3108960" cy="479920"/>
           </a:xfrm>
         </p:spPr>
         <p:txBody>
@@ -1054,7 +1054,7 @@
           <a:p>
             <a:fld id="{F0172217-DC24-48CD-AE89-68C8C8D878B4}" type="datetimeFigureOut">
               <a:rPr lang="en-US" smtClean="0"/>
-              <a:t>9/28/2010</a:t>
+              <a:t>10/9/2010</a:t>
             </a:fld>
             <a:endParaRPr lang="en-US"/>
           </a:p>
@@ -1167,8 +1167,8 @@
         </p:nvSpPr>
         <p:spPr>
           <a:xfrm>
-            <a:off x="182880" y="405237"/>
-            <a:ext cx="1615440" cy="1146159"/>
+            <a:off x="182880" y="511918"/>
+            <a:ext cx="1615440" cy="1447890"/>
           </a:xfrm>
         </p:spPr>
         <p:txBody>
@@ -1252,8 +1252,8 @@
         </p:nvSpPr>
         <p:spPr>
           <a:xfrm>
-            <a:off x="1859280" y="405237"/>
-            <a:ext cx="1615440" cy="1146159"/>
+            <a:off x="1859280" y="511918"/>
+            <a:ext cx="1615440" cy="1447890"/>
           </a:xfrm>
         </p:spPr>
         <p:txBody>
@@ -1342,7 +1342,7 @@
           <a:p>
             <a:fld id="{F0172217-DC24-48CD-AE89-68C8C8D878B4}" type="datetimeFigureOut">
               <a:rPr lang="en-US" smtClean="0"/>
-              <a:t>9/28/2010</a:t>
+              <a:t>10/9/2010</a:t>
             </a:fld>
             <a:endParaRPr lang="en-US"/>
           </a:p>
@@ -1459,8 +1459,8 @@
         </p:nvSpPr>
         <p:spPr>
           <a:xfrm>
-            <a:off x="182887" y="388755"/>
-            <a:ext cx="1616075" cy="162014"/>
+            <a:off x="182888" y="491096"/>
+            <a:ext cx="1616075" cy="204665"/>
           </a:xfrm>
         </p:spPr>
         <p:txBody>
@@ -1524,8 +1524,8 @@
         </p:nvSpPr>
         <p:spPr>
           <a:xfrm>
-            <a:off x="182887" y="550768"/>
-            <a:ext cx="1616075" cy="1000628"/>
+            <a:off x="182888" y="695760"/>
+            <a:ext cx="1616075" cy="1264047"/>
           </a:xfrm>
         </p:spPr>
         <p:txBody>
@@ -1609,8 +1609,8 @@
         </p:nvSpPr>
         <p:spPr>
           <a:xfrm>
-            <a:off x="1858014" y="388755"/>
-            <a:ext cx="1616710" cy="162014"/>
+            <a:off x="1858014" y="491096"/>
+            <a:ext cx="1616710" cy="204665"/>
           </a:xfrm>
         </p:spPr>
         <p:txBody>
@@ -1674,8 +1674,8 @@
         </p:nvSpPr>
         <p:spPr>
           <a:xfrm>
-            <a:off x="1858014" y="550768"/>
-            <a:ext cx="1616710" cy="1000628"/>
+            <a:off x="1858014" y="695760"/>
+            <a:ext cx="1616710" cy="1264047"/>
           </a:xfrm>
         </p:spPr>
         <p:txBody>
@@ -1764,7 +1764,7 @@
           <a:p>
             <a:fld id="{F0172217-DC24-48CD-AE89-68C8C8D878B4}" type="datetimeFigureOut">
               <a:rPr lang="en-US" smtClean="0"/>
-              <a:t>9/28/2010</a:t>
+              <a:t>10/9/2010</a:t>
             </a:fld>
             <a:endParaRPr lang="en-US"/>
           </a:p>
@@ -1882,7 +1882,7 @@
           <a:p>
             <a:fld id="{F0172217-DC24-48CD-AE89-68C8C8D878B4}" type="datetimeFigureOut">
               <a:rPr lang="en-US" smtClean="0"/>
-              <a:t>9/28/2010</a:t>
+              <a:t>10/9/2010</a:t>
             </a:fld>
             <a:endParaRPr lang="en-US"/>
           </a:p>
@@ -1977,7 +1977,7 @@
           <a:p>
             <a:fld id="{F0172217-DC24-48CD-AE89-68C8C8D878B4}" type="datetimeFigureOut">
               <a:rPr lang="en-US" smtClean="0"/>
-              <a:t>9/28/2010</a:t>
+              <a:t>10/9/2010</a:t>
             </a:fld>
             <a:endParaRPr lang="en-US"/>
           </a:p>
@@ -2067,8 +2067,8 @@
         </p:nvSpPr>
         <p:spPr>
           <a:xfrm>
-            <a:off x="182881" y="69148"/>
-            <a:ext cx="1203326" cy="294278"/>
+            <a:off x="182881" y="87351"/>
+            <a:ext cx="1203326" cy="371748"/>
           </a:xfrm>
         </p:spPr>
         <p:txBody>
@@ -2099,8 +2099,8 @@
         </p:nvSpPr>
         <p:spPr>
           <a:xfrm>
-            <a:off x="1430021" y="69149"/>
-            <a:ext cx="2044700" cy="1482247"/>
+            <a:off x="1430021" y="87353"/>
+            <a:ext cx="2044700" cy="1872455"/>
           </a:xfrm>
         </p:spPr>
         <p:txBody>
@@ -2184,8 +2184,8 @@
         </p:nvSpPr>
         <p:spPr>
           <a:xfrm>
-            <a:off x="182881" y="363428"/>
-            <a:ext cx="1203326" cy="1187969"/>
+            <a:off x="182881" y="459102"/>
+            <a:ext cx="1203326" cy="1500707"/>
           </a:xfrm>
         </p:spPr>
         <p:txBody>
@@ -2254,7 +2254,7 @@
           <a:p>
             <a:fld id="{F0172217-DC24-48CD-AE89-68C8C8D878B4}" type="datetimeFigureOut">
               <a:rPr lang="en-US" smtClean="0"/>
-              <a:t>9/28/2010</a:t>
+              <a:t>10/9/2010</a:t>
             </a:fld>
             <a:endParaRPr lang="en-US"/>
           </a:p>
@@ -2344,8 +2344,8 @@
         </p:nvSpPr>
         <p:spPr>
           <a:xfrm>
-            <a:off x="716915" y="1215710"/>
-            <a:ext cx="2194560" cy="143522"/>
+            <a:off x="716915" y="1535751"/>
+            <a:ext cx="2194560" cy="181305"/>
           </a:xfrm>
         </p:spPr>
         <p:txBody>
@@ -2376,8 +2376,8 @@
         </p:nvSpPr>
         <p:spPr>
           <a:xfrm>
-            <a:off x="716915" y="155180"/>
-            <a:ext cx="2194560" cy="1042035"/>
+            <a:off x="716915" y="196032"/>
+            <a:ext cx="2194560" cy="1316355"/>
           </a:xfrm>
         </p:spPr>
         <p:txBody>
@@ -2437,8 +2437,8 @@
         </p:nvSpPr>
         <p:spPr>
           <a:xfrm>
-            <a:off x="716915" y="1359230"/>
-            <a:ext cx="2194560" cy="203825"/>
+            <a:off x="716915" y="1717053"/>
+            <a:ext cx="2194560" cy="257483"/>
           </a:xfrm>
         </p:spPr>
         <p:txBody>
@@ -2507,7 +2507,7 @@
           <a:p>
             <a:fld id="{F0172217-DC24-48CD-AE89-68C8C8D878B4}" type="datetimeFigureOut">
               <a:rPr lang="en-US" smtClean="0"/>
-              <a:t>9/28/2010</a:t>
+              <a:t>10/9/2010</a:t>
             </a:fld>
             <a:endParaRPr lang="en-US"/>
           </a:p>
@@ -2602,8 +2602,8 @@
         </p:nvSpPr>
         <p:spPr>
           <a:xfrm>
-            <a:off x="182880" y="69551"/>
-            <a:ext cx="3291840" cy="289454"/>
+            <a:off x="182880" y="87861"/>
+            <a:ext cx="3291840" cy="365654"/>
           </a:xfrm>
           <a:prstGeom prst="rect">
             <a:avLst/>
@@ -2635,8 +2635,8 @@
         </p:nvSpPr>
         <p:spPr>
           <a:xfrm>
-            <a:off x="182880" y="405237"/>
-            <a:ext cx="3291840" cy="1146159"/>
+            <a:off x="182880" y="511918"/>
+            <a:ext cx="3291840" cy="1447890"/>
           </a:xfrm>
           <a:prstGeom prst="rect">
             <a:avLst/>
@@ -2697,8 +2697,8 @@
         </p:nvSpPr>
         <p:spPr>
           <a:xfrm>
-            <a:off x="182880" y="1609690"/>
-            <a:ext cx="853440" cy="92465"/>
+            <a:off x="182880" y="2033448"/>
+            <a:ext cx="853440" cy="116807"/>
           </a:xfrm>
           <a:prstGeom prst="rect">
             <a:avLst/>
@@ -2720,7 +2720,7 @@
           <a:p>
             <a:fld id="{F0172217-DC24-48CD-AE89-68C8C8D878B4}" type="datetimeFigureOut">
               <a:rPr lang="en-US" smtClean="0"/>
-              <a:t>9/28/2010</a:t>
+              <a:t>10/9/2010</a:t>
             </a:fld>
             <a:endParaRPr lang="en-US"/>
           </a:p>
@@ -2738,8 +2738,8 @@
         </p:nvSpPr>
         <p:spPr>
           <a:xfrm>
-            <a:off x="1249680" y="1609690"/>
-            <a:ext cx="1158240" cy="92465"/>
+            <a:off x="1249680" y="2033448"/>
+            <a:ext cx="1158240" cy="116807"/>
           </a:xfrm>
           <a:prstGeom prst="rect">
             <a:avLst/>
@@ -2775,8 +2775,8 @@
         </p:nvSpPr>
         <p:spPr>
           <a:xfrm>
-            <a:off x="2621280" y="1609690"/>
-            <a:ext cx="853440" cy="92465"/>
+            <a:off x="2621280" y="2033448"/>
+            <a:ext cx="853440" cy="116807"/>
           </a:xfrm>
           <a:prstGeom prst="rect">
             <a:avLst/>
@@ -3097,27 +3097,27 @@
       </p:grpSpPr>
       <p:grpSp>
         <p:nvGrpSpPr>
-          <p:cNvPr id="2" name="Group 1"/>
+          <p:cNvPr id="8" name="Group 7"/>
           <p:cNvGrpSpPr/>
           <p:nvPr/>
         </p:nvGrpSpPr>
         <p:grpSpPr>
           <a:xfrm>
-            <a:off x="97799" y="69680"/>
-            <a:ext cx="3462002" cy="1597364"/>
-            <a:chOff x="72860" y="90707"/>
-            <a:chExt cx="3462002" cy="1597364"/>
+            <a:off x="76200" y="69680"/>
+            <a:ext cx="3483601" cy="2094082"/>
+            <a:chOff x="76200" y="69680"/>
+            <a:chExt cx="3483601" cy="2094082"/>
           </a:xfrm>
         </p:grpSpPr>
         <p:sp>
           <p:nvSpPr>
-            <p:cNvPr id="30" name="Rectangle 29"/>
+            <p:cNvPr id="18" name="Rectangle 17"/>
             <p:cNvSpPr/>
             <p:nvPr/>
           </p:nvSpPr>
           <p:spPr>
             <a:xfrm>
-              <a:off x="120240" y="91281"/>
+              <a:off x="145179" y="70254"/>
               <a:ext cx="2764770" cy="243840"/>
             </a:xfrm>
             <a:prstGeom prst="rect">
@@ -3185,13 +3185,13 @@
         </p:sp>
         <p:sp>
           <p:nvSpPr>
-            <p:cNvPr id="31" name="Diamond 30"/>
+            <p:cNvPr id="19" name="Diamond 18"/>
             <p:cNvSpPr/>
             <p:nvPr/>
           </p:nvSpPr>
           <p:spPr>
             <a:xfrm>
-              <a:off x="86402" y="333114"/>
+              <a:off x="111341" y="312087"/>
               <a:ext cx="66869" cy="152398"/>
             </a:xfrm>
             <a:prstGeom prst="diamond">
@@ -3233,16 +3233,16 @@
         </p:sp>
         <p:cxnSp>
           <p:nvCxnSpPr>
-            <p:cNvPr id="32" name="Elbow Connector 31"/>
+            <p:cNvPr id="20" name="Elbow Connector 19"/>
             <p:cNvCxnSpPr>
-              <a:stCxn id="41" idx="2"/>
-              <a:endCxn id="39" idx="0"/>
+              <a:stCxn id="29" idx="2"/>
+              <a:endCxn id="27" idx="0"/>
             </p:cNvCxnSpPr>
             <p:nvPr/>
           </p:nvCxnSpPr>
           <p:spPr>
             <a:xfrm rot="16200000" flipH="1">
-              <a:off x="766804" y="755826"/>
+              <a:off x="791743" y="734799"/>
               <a:ext cx="248734" cy="1006155"/>
             </a:xfrm>
             <a:prstGeom prst="bentConnector3">
@@ -3271,55 +3271,15 @@
             </a:fontRef>
           </p:style>
         </p:cxnSp>
-        <p:cxnSp>
-          <p:nvCxnSpPr>
-            <p:cNvPr id="33" name="Elbow Connector 32"/>
-            <p:cNvCxnSpPr>
-              <a:stCxn id="31" idx="2"/>
-              <a:endCxn id="34" idx="0"/>
-            </p:cNvCxnSpPr>
-            <p:nvPr/>
-          </p:nvCxnSpPr>
-          <p:spPr>
-            <a:xfrm rot="16200000" flipH="1">
-              <a:off x="570294" y="35055"/>
-              <a:ext cx="191828" cy="1092742"/>
-            </a:xfrm>
-            <a:prstGeom prst="bentConnector3">
-              <a:avLst>
-                <a:gd name="adj1" fmla="val 50000"/>
-              </a:avLst>
-            </a:prstGeom>
-            <a:ln w="6350">
-              <a:solidFill>
-                <a:srgbClr val="00B050"/>
-              </a:solidFill>
-            </a:ln>
-          </p:spPr>
-          <p:style>
-            <a:lnRef idx="1">
-              <a:schemeClr val="accent1"/>
-            </a:lnRef>
-            <a:fillRef idx="0">
-              <a:schemeClr val="accent1"/>
-            </a:fillRef>
-            <a:effectRef idx="0">
-              <a:schemeClr val="accent1"/>
-            </a:effectRef>
-            <a:fontRef idx="minor">
-              <a:schemeClr val="tx1"/>
-            </a:fontRef>
-          </p:style>
-        </p:cxnSp>
         <p:sp>
           <p:nvSpPr>
-            <p:cNvPr id="34" name="Rectangle 33"/>
+            <p:cNvPr id="22" name="Rectangle 21"/>
             <p:cNvSpPr/>
             <p:nvPr/>
           </p:nvSpPr>
           <p:spPr>
             <a:xfrm>
-              <a:off x="388094" y="677340"/>
+              <a:off x="413033" y="656313"/>
               <a:ext cx="1648969" cy="304800"/>
             </a:xfrm>
             <a:prstGeom prst="rect">
@@ -3366,13 +3326,13 @@
         </p:sp>
         <p:sp>
           <p:nvSpPr>
-            <p:cNvPr id="35" name="Rectangle 34"/>
+            <p:cNvPr id="23" name="Rectangle 22"/>
             <p:cNvSpPr/>
             <p:nvPr/>
           </p:nvSpPr>
           <p:spPr>
             <a:xfrm>
-              <a:off x="2952693" y="90707"/>
+              <a:off x="2977632" y="69680"/>
               <a:ext cx="582169" cy="244414"/>
             </a:xfrm>
             <a:prstGeom prst="rect">
@@ -3381,7 +3341,7 @@
             <a:noFill/>
             <a:ln w="6350">
               <a:solidFill>
-                <a:srgbClr val="002060"/>
+                <a:schemeClr val="tx1"/>
               </a:solidFill>
             </a:ln>
           </p:spPr>
@@ -3419,13 +3379,13 @@
         </p:sp>
         <p:sp>
           <p:nvSpPr>
-            <p:cNvPr id="36" name="Isosceles Triangle 35"/>
+            <p:cNvPr id="24" name="Isosceles Triangle 23"/>
             <p:cNvSpPr/>
             <p:nvPr/>
           </p:nvSpPr>
           <p:spPr>
             <a:xfrm>
-              <a:off x="3164177" y="334770"/>
+              <a:off x="3189116" y="313743"/>
               <a:ext cx="159199" cy="114300"/>
             </a:xfrm>
             <a:prstGeom prst="triangle">
@@ -3434,7 +3394,7 @@
             <a:noFill/>
             <a:ln w="6350">
               <a:solidFill>
-                <a:srgbClr val="002060"/>
+                <a:schemeClr val="tx1"/>
               </a:solidFill>
             </a:ln>
           </p:spPr>
@@ -3469,16 +3429,16 @@
         </p:sp>
         <p:cxnSp>
           <p:nvCxnSpPr>
-            <p:cNvPr id="37" name="Elbow Connector 36"/>
+            <p:cNvPr id="25" name="Elbow Connector 24"/>
             <p:cNvCxnSpPr>
-              <a:stCxn id="34" idx="3"/>
-              <a:endCxn id="36" idx="3"/>
+              <a:stCxn id="22" idx="3"/>
+              <a:endCxn id="24" idx="3"/>
             </p:cNvCxnSpPr>
             <p:nvPr/>
           </p:nvCxnSpPr>
           <p:spPr>
             <a:xfrm flipV="1">
-              <a:off x="2037063" y="449070"/>
+              <a:off x="2062002" y="428043"/>
               <a:ext cx="1206714" cy="380670"/>
             </a:xfrm>
             <a:prstGeom prst="bentConnector2">
@@ -3507,13 +3467,13 @@
         </p:cxnSp>
         <p:sp>
           <p:nvSpPr>
-            <p:cNvPr id="38" name="Rectangle 37"/>
+            <p:cNvPr id="26" name="Rectangle 25"/>
             <p:cNvSpPr/>
             <p:nvPr/>
           </p:nvSpPr>
           <p:spPr>
             <a:xfrm>
-              <a:off x="72860" y="392671"/>
+              <a:off x="97799" y="371644"/>
               <a:ext cx="1252266" cy="369332"/>
             </a:xfrm>
             <a:prstGeom prst="rect">
@@ -3554,13 +3514,13 @@
         </p:sp>
         <p:sp>
           <p:nvSpPr>
-            <p:cNvPr id="39" name="Rectangle 38"/>
+            <p:cNvPr id="27" name="Rectangle 26"/>
             <p:cNvSpPr/>
             <p:nvPr/>
           </p:nvSpPr>
           <p:spPr>
             <a:xfrm>
-              <a:off x="569764" y="1383271"/>
+              <a:off x="594703" y="1362244"/>
               <a:ext cx="1648969" cy="304800"/>
             </a:xfrm>
             <a:prstGeom prst="rect">
@@ -3600,11 +3560,27 @@
                     <a:sysClr val="windowText" lastClr="000000"/>
                   </a:solidFill>
                 </a:rPr>
-                <a:t>Model</a:t>
+                <a:t>Model </a:t>
+              </a:r>
+              <a:r>
+                <a:rPr lang="en-US" sz="1100" b="1" i="1" dirty="0">
+                  <a:solidFill>
+                    <a:srgbClr val="00B050"/>
+                  </a:solidFill>
+                </a:rPr>
+                <a:t>(extended</a:t>
+              </a:r>
+              <a:r>
+                <a:rPr lang="en-US" sz="1100" b="1" i="1" dirty="0" smtClean="0">
+                  <a:solidFill>
+                    <a:srgbClr val="00B050"/>
+                  </a:solidFill>
+                </a:rPr>
+                <a:t>)</a:t>
               </a:r>
               <a:endParaRPr lang="en-US" sz="1100" b="1" dirty="0">
                 <a:solidFill>
-                  <a:sysClr val="windowText" lastClr="000000"/>
+                  <a:schemeClr val="tx1"/>
                 </a:solidFill>
               </a:endParaRPr>
             </a:p>
@@ -3612,13 +3588,13 @@
         </p:sp>
         <p:sp>
           <p:nvSpPr>
-            <p:cNvPr id="40" name="Rectangle 39"/>
+            <p:cNvPr id="28" name="Rectangle 27"/>
             <p:cNvSpPr/>
             <p:nvPr/>
           </p:nvSpPr>
           <p:spPr>
             <a:xfrm>
-              <a:off x="339999" y="1039012"/>
+              <a:off x="364938" y="1017985"/>
               <a:ext cx="950901" cy="369332"/>
             </a:xfrm>
             <a:prstGeom prst="rect">
@@ -3662,13 +3638,13 @@
         </p:sp>
         <p:sp>
           <p:nvSpPr>
-            <p:cNvPr id="41" name="Diamond 40"/>
+            <p:cNvPr id="29" name="Diamond 28"/>
             <p:cNvSpPr/>
             <p:nvPr/>
           </p:nvSpPr>
           <p:spPr>
             <a:xfrm>
-              <a:off x="354659" y="982139"/>
+              <a:off x="379598" y="961112"/>
               <a:ext cx="66869" cy="152398"/>
             </a:xfrm>
             <a:prstGeom prst="diamond">
@@ -3714,16 +3690,16 @@
         </p:sp>
         <p:cxnSp>
           <p:nvCxnSpPr>
-            <p:cNvPr id="42" name="Elbow Connector 41"/>
+            <p:cNvPr id="44" name="Elbow Connector 43"/>
             <p:cNvCxnSpPr>
-              <a:stCxn id="30" idx="2"/>
-              <a:endCxn id="36" idx="3"/>
+              <a:stCxn id="18" idx="2"/>
+              <a:endCxn id="24" idx="3"/>
             </p:cNvCxnSpPr>
             <p:nvPr/>
           </p:nvCxnSpPr>
           <p:spPr>
             <a:xfrm rot="16200000" flipH="1">
-              <a:off x="2316227" y="-478481"/>
+              <a:off x="2341166" y="-499508"/>
               <a:ext cx="113949" cy="1741152"/>
             </a:xfrm>
             <a:prstGeom prst="bentConnector3">
@@ -3754,16 +3730,16 @@
         </p:cxnSp>
         <p:cxnSp>
           <p:nvCxnSpPr>
-            <p:cNvPr id="43" name="Elbow Connector 42"/>
+            <p:cNvPr id="45" name="Elbow Connector 44"/>
             <p:cNvCxnSpPr>
-              <a:stCxn id="39" idx="3"/>
-              <a:endCxn id="36" idx="3"/>
+              <a:stCxn id="27" idx="3"/>
+              <a:endCxn id="24" idx="3"/>
             </p:cNvCxnSpPr>
             <p:nvPr/>
           </p:nvCxnSpPr>
           <p:spPr>
             <a:xfrm flipV="1">
-              <a:off x="2218733" y="449070"/>
+              <a:off x="2243672" y="428043"/>
               <a:ext cx="1025044" cy="1086601"/>
             </a:xfrm>
             <a:prstGeom prst="bentConnector2">
@@ -3772,6 +3748,230 @@
             <a:ln w="6350">
               <a:solidFill>
                 <a:schemeClr val="tx1"/>
+              </a:solidFill>
+            </a:ln>
+          </p:spPr>
+          <p:style>
+            <a:lnRef idx="1">
+              <a:schemeClr val="accent1"/>
+            </a:lnRef>
+            <a:fillRef idx="0">
+              <a:schemeClr val="accent1"/>
+            </a:fillRef>
+            <a:effectRef idx="0">
+              <a:schemeClr val="accent1"/>
+            </a:effectRef>
+            <a:fontRef idx="minor">
+              <a:schemeClr val="tx1"/>
+            </a:fontRef>
+          </p:style>
+        </p:cxnSp>
+        <p:cxnSp>
+          <p:nvCxnSpPr>
+            <p:cNvPr id="46" name="Elbow Connector 45"/>
+            <p:cNvCxnSpPr>
+              <a:stCxn id="19" idx="2"/>
+              <a:endCxn id="47" idx="0"/>
+            </p:cNvCxnSpPr>
+            <p:nvPr/>
+          </p:nvCxnSpPr>
+          <p:spPr>
+            <a:xfrm rot="16200000" flipH="1">
+              <a:off x="-6091" y="615352"/>
+              <a:ext cx="1394477" cy="1092742"/>
+            </a:xfrm>
+            <a:prstGeom prst="bentConnector3">
+              <a:avLst>
+                <a:gd name="adj1" fmla="val 93330"/>
+              </a:avLst>
+            </a:prstGeom>
+            <a:ln w="6350">
+              <a:solidFill>
+                <a:schemeClr val="tx1"/>
+              </a:solidFill>
+            </a:ln>
+          </p:spPr>
+          <p:style>
+            <a:lnRef idx="1">
+              <a:schemeClr val="accent1"/>
+            </a:lnRef>
+            <a:fillRef idx="0">
+              <a:schemeClr val="accent1"/>
+            </a:fillRef>
+            <a:effectRef idx="0">
+              <a:schemeClr val="accent1"/>
+            </a:effectRef>
+            <a:fontRef idx="minor">
+              <a:schemeClr val="tx1"/>
+            </a:fontRef>
+          </p:style>
+        </p:cxnSp>
+        <p:sp>
+          <p:nvSpPr>
+            <p:cNvPr id="47" name="Rectangle 46"/>
+            <p:cNvSpPr/>
+            <p:nvPr/>
+          </p:nvSpPr>
+          <p:spPr>
+            <a:xfrm>
+              <a:off x="413033" y="1858962"/>
+              <a:ext cx="1648969" cy="304800"/>
+            </a:xfrm>
+            <a:prstGeom prst="rect">
+              <a:avLst/>
+            </a:prstGeom>
+            <a:noFill/>
+            <a:ln w="6350">
+              <a:solidFill>
+                <a:schemeClr val="tx1"/>
+              </a:solidFill>
+            </a:ln>
+          </p:spPr>
+          <p:style>
+            <a:lnRef idx="2">
+              <a:schemeClr val="accent1">
+                <a:shade val="50000"/>
+              </a:schemeClr>
+            </a:lnRef>
+            <a:fillRef idx="1">
+              <a:schemeClr val="accent1"/>
+            </a:fillRef>
+            <a:effectRef idx="0">
+              <a:schemeClr val="accent1"/>
+            </a:effectRef>
+            <a:fontRef idx="minor">
+              <a:schemeClr val="lt1"/>
+            </a:fontRef>
+          </p:style>
+          <p:txBody>
+            <a:bodyPr lIns="91440" tIns="45720" rIns="91440" bIns="45720" spcCol="0" rtlCol="0" anchor="ctr"/>
+            <a:lstStyle/>
+            <a:p>
+              <a:pPr algn="ctr"/>
+              <a:r>
+                <a:rPr lang="en-US" sz="1100" b="1" dirty="0" smtClean="0">
+                  <a:solidFill>
+                    <a:sysClr val="windowText" lastClr="000000"/>
+                  </a:solidFill>
+                </a:rPr>
+                <a:t>Model </a:t>
+              </a:r>
+              <a:r>
+                <a:rPr lang="en-US" sz="1100" b="1" i="1" dirty="0">
+                  <a:solidFill>
+                    <a:srgbClr val="00B050"/>
+                  </a:solidFill>
+                </a:rPr>
+                <a:t>(extended</a:t>
+              </a:r>
+              <a:r>
+                <a:rPr lang="en-US" sz="1100" b="1" i="1" dirty="0" smtClean="0">
+                  <a:solidFill>
+                    <a:srgbClr val="00B050"/>
+                  </a:solidFill>
+                </a:rPr>
+                <a:t>)</a:t>
+              </a:r>
+              <a:endParaRPr lang="en-US" sz="1100" b="1" dirty="0">
+                <a:solidFill>
+                  <a:schemeClr val="tx1"/>
+                </a:solidFill>
+              </a:endParaRPr>
+            </a:p>
+          </p:txBody>
+        </p:sp>
+        <p:sp>
+          <p:nvSpPr>
+            <p:cNvPr id="48" name="Rectangle 47"/>
+            <p:cNvSpPr/>
+            <p:nvPr/>
+          </p:nvSpPr>
+          <p:spPr>
+            <a:xfrm>
+              <a:off x="76200" y="1582358"/>
+              <a:ext cx="484428" cy="230832"/>
+            </a:xfrm>
+            <a:prstGeom prst="rect">
+              <a:avLst/>
+            </a:prstGeom>
+            <a:ln>
+              <a:noFill/>
+            </a:ln>
+          </p:spPr>
+          <p:txBody>
+            <a:bodyPr wrap="none" lIns="91440" tIns="45720" rIns="91440" bIns="45720">
+              <a:spAutoFit/>
+            </a:bodyPr>
+            <a:lstStyle/>
+            <a:p>
+              <a:r>
+                <a:rPr lang="en-US" sz="900" dirty="0" smtClean="0"/>
+                <a:t>model</a:t>
+              </a:r>
+              <a:endParaRPr lang="en-US" sz="900" dirty="0"/>
+            </a:p>
+          </p:txBody>
+        </p:sp>
+        <p:cxnSp>
+          <p:nvCxnSpPr>
+            <p:cNvPr id="49" name="Elbow Connector 48"/>
+            <p:cNvCxnSpPr>
+              <a:stCxn id="47" idx="3"/>
+              <a:endCxn id="24" idx="3"/>
+            </p:cNvCxnSpPr>
+            <p:nvPr/>
+          </p:nvCxnSpPr>
+          <p:spPr>
+            <a:xfrm flipV="1">
+              <a:off x="2062002" y="428043"/>
+              <a:ext cx="1206714" cy="1583319"/>
+            </a:xfrm>
+            <a:prstGeom prst="bentConnector2">
+              <a:avLst/>
+            </a:prstGeom>
+            <a:ln w="6350">
+              <a:solidFill>
+                <a:schemeClr val="tx1"/>
+              </a:solidFill>
+            </a:ln>
+          </p:spPr>
+          <p:style>
+            <a:lnRef idx="1">
+              <a:schemeClr val="accent1"/>
+            </a:lnRef>
+            <a:fillRef idx="0">
+              <a:schemeClr val="accent1"/>
+            </a:fillRef>
+            <a:effectRef idx="0">
+              <a:schemeClr val="accent1"/>
+            </a:effectRef>
+            <a:fontRef idx="minor">
+              <a:schemeClr val="tx1"/>
+            </a:fontRef>
+          </p:style>
+        </p:cxnSp>
+        <p:cxnSp>
+          <p:nvCxnSpPr>
+            <p:cNvPr id="21" name="Elbow Connector 20"/>
+            <p:cNvCxnSpPr>
+              <a:stCxn id="19" idx="2"/>
+              <a:endCxn id="22" idx="0"/>
+            </p:cNvCxnSpPr>
+            <p:nvPr/>
+          </p:nvCxnSpPr>
+          <p:spPr>
+            <a:xfrm rot="16200000" flipH="1">
+              <a:off x="595233" y="14028"/>
+              <a:ext cx="191828" cy="1092742"/>
+            </a:xfrm>
+            <a:prstGeom prst="bentConnector3">
+              <a:avLst>
+                <a:gd name="adj1" fmla="val 50000"/>
+              </a:avLst>
+            </a:prstGeom>
+            <a:ln w="6350">
+              <a:solidFill>
+                <a:srgbClr val="00B050"/>
               </a:solidFill>
             </a:ln>
           </p:spPr>

</xml_diff>